<commit_message>
Analyzed the remaining 16 discs
</commit_message>
<xml_diff>
--- a/AIChE_Pavel.pptx
+++ b/AIChE_Pavel.pptx
@@ -43610,10 +43610,10 @@
         </p:nvGrpSpPr>
         <p:grpSpPr>
           <a:xfrm>
-            <a:off x="6309450" y="1762466"/>
-            <a:ext cx="4572000" cy="4386587"/>
-            <a:chOff x="6309450" y="1762466"/>
-            <a:chExt cx="4572000" cy="4386587"/>
+            <a:off x="6309450" y="1879285"/>
+            <a:ext cx="4572000" cy="4269768"/>
+            <a:chOff x="6309450" y="1879285"/>
+            <a:chExt cx="4572000" cy="4269768"/>
           </a:xfrm>
         </p:grpSpPr>
         <p:pic>
@@ -43745,9 +43745,9 @@
             <p:nvPr/>
           </p:nvCxnSpPr>
           <p:spPr>
-            <a:xfrm flipH="1">
-              <a:off x="8628635" y="1762466"/>
-              <a:ext cx="8229" cy="4384227"/>
+            <a:xfrm>
+              <a:off x="8628635" y="1879285"/>
+              <a:ext cx="1" cy="4267408"/>
             </a:xfrm>
             <a:prstGeom prst="line">
               <a:avLst/>

</xml_diff>